<commit_message>
[CodySimulator]  - 옷 종류 14개까지 늘림
</commit_message>
<xml_diff>
--- a/DocumentTrunk/기획/CodySimulator.pptx
+++ b/DocumentTrunk/기획/CodySimulator.pptx
@@ -1816,7 +1816,7 @@
           <a:p>
             <a:fld id="{63707F25-55FE-42FE-A6D5-A80E3A4016FF}" type="datetimeFigureOut">
               <a:rPr lang="ko-KR" altLang="en-US" smtClean="0"/>
-              <a:t>2020-05-19</a:t>
+              <a:t>2020-07-28</a:t>
             </a:fld>
             <a:endParaRPr lang="ko-KR" altLang="en-US"/>
           </a:p>
@@ -3495,7 +3495,7 @@
           <a:p>
             <a:fld id="{63707F25-55FE-42FE-A6D5-A80E3A4016FF}" type="datetimeFigureOut">
               <a:rPr lang="ko-KR" altLang="en-US" smtClean="0"/>
-              <a:t>2020-05-19</a:t>
+              <a:t>2020-07-28</a:t>
             </a:fld>
             <a:endParaRPr lang="ko-KR" altLang="en-US"/>
           </a:p>
@@ -5182,7 +5182,7 @@
           <a:p>
             <a:fld id="{63707F25-55FE-42FE-A6D5-A80E3A4016FF}" type="datetimeFigureOut">
               <a:rPr lang="ko-KR" altLang="en-US" smtClean="0"/>
-              <a:t>2020-05-19</a:t>
+              <a:t>2020-07-28</a:t>
             </a:fld>
             <a:endParaRPr lang="ko-KR" altLang="en-US"/>
           </a:p>
@@ -5353,7 +5353,7 @@
           <a:p>
             <a:fld id="{63707F25-55FE-42FE-A6D5-A80E3A4016FF}" type="datetimeFigureOut">
               <a:rPr lang="ko-KR" altLang="en-US" smtClean="0"/>
-              <a:t>2020-05-19</a:t>
+              <a:t>2020-07-28</a:t>
             </a:fld>
             <a:endParaRPr lang="ko-KR" altLang="en-US"/>
           </a:p>
@@ -7075,7 +7075,7 @@
           <a:p>
             <a:fld id="{63707F25-55FE-42FE-A6D5-A80E3A4016FF}" type="datetimeFigureOut">
               <a:rPr lang="ko-KR" altLang="en-US" smtClean="0"/>
-              <a:t>2020-05-19</a:t>
+              <a:t>2020-07-28</a:t>
             </a:fld>
             <a:endParaRPr lang="ko-KR" altLang="en-US"/>
           </a:p>
@@ -8068,7 +8068,7 @@
           <a:p>
             <a:fld id="{63707F25-55FE-42FE-A6D5-A80E3A4016FF}" type="datetimeFigureOut">
               <a:rPr lang="ko-KR" altLang="en-US" smtClean="0"/>
-              <a:t>2020-05-19</a:t>
+              <a:t>2020-07-28</a:t>
             </a:fld>
             <a:endParaRPr lang="ko-KR" altLang="en-US"/>
           </a:p>
@@ -8339,7 +8339,7 @@
           <a:p>
             <a:fld id="{63707F25-55FE-42FE-A6D5-A80E3A4016FF}" type="datetimeFigureOut">
               <a:rPr lang="ko-KR" altLang="en-US" smtClean="0"/>
-              <a:t>2020-05-19</a:t>
+              <a:t>2020-07-28</a:t>
             </a:fld>
             <a:endParaRPr lang="ko-KR" altLang="en-US"/>
           </a:p>
@@ -9442,7 +9442,7 @@
           <a:p>
             <a:fld id="{63707F25-55FE-42FE-A6D5-A80E3A4016FF}" type="datetimeFigureOut">
               <a:rPr lang="ko-KR" altLang="en-US" smtClean="0"/>
-              <a:t>2020-05-19</a:t>
+              <a:t>2020-07-28</a:t>
             </a:fld>
             <a:endParaRPr lang="ko-KR" altLang="en-US"/>
           </a:p>
@@ -10421,7 +10421,7 @@
           <a:p>
             <a:fld id="{63707F25-55FE-42FE-A6D5-A80E3A4016FF}" type="datetimeFigureOut">
               <a:rPr lang="ko-KR" altLang="en-US" smtClean="0"/>
-              <a:t>2020-05-19</a:t>
+              <a:t>2020-07-28</a:t>
             </a:fld>
             <a:endParaRPr lang="ko-KR" altLang="en-US"/>
           </a:p>
@@ -13934,7 +13934,7 @@
           <a:p>
             <a:fld id="{63707F25-55FE-42FE-A6D5-A80E3A4016FF}" type="datetimeFigureOut">
               <a:rPr lang="ko-KR" altLang="en-US" smtClean="0"/>
-              <a:t>2020-05-19</a:t>
+              <a:t>2020-07-28</a:t>
             </a:fld>
             <a:endParaRPr lang="ko-KR" altLang="en-US"/>
           </a:p>
@@ -14206,7 +14206,7 @@
           <a:p>
             <a:fld id="{63707F25-55FE-42FE-A6D5-A80E3A4016FF}" type="datetimeFigureOut">
               <a:rPr lang="ko-KR" altLang="en-US" smtClean="0"/>
-              <a:t>2020-05-19</a:t>
+              <a:t>2020-07-28</a:t>
             </a:fld>
             <a:endParaRPr lang="ko-KR" altLang="en-US"/>
           </a:p>
@@ -16957,7 +16957,7 @@
           <a:p>
             <a:fld id="{63707F25-55FE-42FE-A6D5-A80E3A4016FF}" type="datetimeFigureOut">
               <a:rPr lang="ko-KR" altLang="en-US" smtClean="0"/>
-              <a:t>2020-05-19</a:t>
+              <a:t>2020-07-28</a:t>
             </a:fld>
             <a:endParaRPr lang="ko-KR" altLang="en-US"/>
           </a:p>
@@ -18001,42 +18001,6 @@
           <a:chExt cx="0" cy="0"/>
         </a:xfrm>
       </p:grpSpPr>
-      <p:pic>
-        <p:nvPicPr>
-          <p:cNvPr id="49" name="그림 48">
-            <a:extLst>
-              <a:ext uri="{FF2B5EF4-FFF2-40B4-BE49-F238E27FC236}">
-                <a16:creationId xmlns:a16="http://schemas.microsoft.com/office/drawing/2014/main" id="{E191B726-C1E2-4C9F-A6FF-BA5AB37D6913}"/>
-              </a:ext>
-            </a:extLst>
-          </p:cNvPr>
-          <p:cNvPicPr>
-            <a:picLocks noChangeAspect="1"/>
-          </p:cNvPicPr>
-          <p:nvPr/>
-        </p:nvPicPr>
-        <p:blipFill>
-          <a:blip r:embed="rId2">
-            <a:extLst>
-              <a:ext uri="{28A0092B-C50C-407E-A947-70E740481C1C}">
-                <a14:useLocalDpi xmlns:a14="http://schemas.microsoft.com/office/drawing/2010/main" val="0"/>
-              </a:ext>
-            </a:extLst>
-          </a:blip>
-          <a:stretch>
-            <a:fillRect/>
-          </a:stretch>
-        </p:blipFill>
-        <p:spPr>
-          <a:xfrm>
-            <a:off x="1029087" y="3987592"/>
-            <a:ext cx="1233055" cy="1233055"/>
-          </a:xfrm>
-          <a:prstGeom prst="rect">
-            <a:avLst/>
-          </a:prstGeom>
-        </p:spPr>
-      </p:pic>
       <p:sp>
         <p:nvSpPr>
           <p:cNvPr id="4" name="직사각형 3">
@@ -18145,13 +18109,13 @@
           <p:nvPr/>
         </p:nvPicPr>
         <p:blipFill>
-          <a:blip r:embed="rId3">
+          <a:blip r:embed="rId2">
             <a:extLst>
               <a:ext uri="{28A0092B-C50C-407E-A947-70E740481C1C}">
                 <a14:useLocalDpi xmlns:a14="http://schemas.microsoft.com/office/drawing/2010/main" val="0"/>
               </a:ext>
               <a:ext uri="{837473B0-CC2E-450A-ABE3-18F120FF3D39}">
-                <a1611:picAttrSrcUrl xmlns:a1611="http://schemas.microsoft.com/office/drawing/2016/11/main" r:id="rId4"/>
+                <a1611:picAttrSrcUrl xmlns:a1611="http://schemas.microsoft.com/office/drawing/2016/11/main" r:id="rId3"/>
               </a:ext>
             </a:extLst>
           </a:blip>
@@ -18230,7 +18194,7 @@
         </p:nvSpPr>
         <p:spPr>
           <a:xfrm>
-            <a:off x="1252078" y="2395994"/>
+            <a:off x="1155263" y="2261909"/>
             <a:ext cx="1464815" cy="923330"/>
           </a:xfrm>
           <a:prstGeom prst="rect">
@@ -18285,13 +18249,13 @@
           <p:nvPr/>
         </p:nvPicPr>
         <p:blipFill>
-          <a:blip r:embed="rId5">
+          <a:blip r:embed="rId4">
             <a:extLst>
               <a:ext uri="{28A0092B-C50C-407E-A947-70E740481C1C}">
                 <a14:useLocalDpi xmlns:a14="http://schemas.microsoft.com/office/drawing/2010/main" val="0"/>
               </a:ext>
               <a:ext uri="{837473B0-CC2E-450A-ABE3-18F120FF3D39}">
-                <a1611:picAttrSrcUrl xmlns:a1611="http://schemas.microsoft.com/office/drawing/2016/11/main" r:id="rId6"/>
+                <a1611:picAttrSrcUrl xmlns:a1611="http://schemas.microsoft.com/office/drawing/2016/11/main" r:id="rId5"/>
               </a:ext>
             </a:extLst>
           </a:blip>
@@ -18324,13 +18288,13 @@
           <p:nvPr/>
         </p:nvPicPr>
         <p:blipFill>
-          <a:blip r:embed="rId5">
+          <a:blip r:embed="rId4">
             <a:extLst>
               <a:ext uri="{28A0092B-C50C-407E-A947-70E740481C1C}">
                 <a14:useLocalDpi xmlns:a14="http://schemas.microsoft.com/office/drawing/2010/main" val="0"/>
               </a:ext>
               <a:ext uri="{837473B0-CC2E-450A-ABE3-18F120FF3D39}">
-                <a1611:picAttrSrcUrl xmlns:a1611="http://schemas.microsoft.com/office/drawing/2016/11/main" r:id="rId6"/>
+                <a1611:picAttrSrcUrl xmlns:a1611="http://schemas.microsoft.com/office/drawing/2016/11/main" r:id="rId5"/>
               </a:ext>
             </a:extLst>
           </a:blip>
@@ -18611,7 +18575,7 @@
                     <a:lstStyle/>
                     <a:p>
                       <a:pPr latinLnBrk="1"/>
-                      <a:endParaRPr lang="ko-KR" altLang="en-US"/>
+                      <a:endParaRPr lang="ko-KR" altLang="en-US" dirty="0"/>
                     </a:p>
                   </a:txBody>
                   <a:tcPr>
@@ -18716,7 +18680,7 @@
                     <a:lstStyle/>
                     <a:p>
                       <a:pPr latinLnBrk="1"/>
-                      <a:endParaRPr lang="ko-KR" altLang="en-US"/>
+                      <a:endParaRPr lang="ko-KR" altLang="en-US" dirty="0"/>
                     </a:p>
                   </a:txBody>
                   <a:tcPr>
@@ -18821,7 +18785,7 @@
                     <a:lstStyle/>
                     <a:p>
                       <a:pPr latinLnBrk="1"/>
-                      <a:endParaRPr lang="ko-KR" altLang="en-US"/>
+                      <a:endParaRPr lang="ko-KR" altLang="en-US" dirty="0"/>
                     </a:p>
                   </a:txBody>
                   <a:tcPr>
@@ -18926,7 +18890,7 @@
                     <a:lstStyle/>
                     <a:p>
                       <a:pPr latinLnBrk="1"/>
-                      <a:endParaRPr lang="ko-KR" altLang="en-US"/>
+                      <a:endParaRPr lang="ko-KR" altLang="en-US" dirty="0"/>
                     </a:p>
                   </a:txBody>
                   <a:tcPr>
@@ -19031,7 +18995,7 @@
                     <a:lstStyle/>
                     <a:p>
                       <a:pPr latinLnBrk="1"/>
-                      <a:endParaRPr lang="ko-KR" altLang="en-US"/>
+                      <a:endParaRPr lang="ko-KR" altLang="en-US" dirty="0"/>
                     </a:p>
                   </a:txBody>
                   <a:tcPr>
@@ -19235,7 +19199,7 @@
         </p:nvSpPr>
         <p:spPr>
           <a:xfrm>
-            <a:off x="2716893" y="4659035"/>
+            <a:off x="2707785" y="4676747"/>
             <a:ext cx="1201445" cy="296671"/>
           </a:xfrm>
           <a:prstGeom prst="rect">
@@ -19367,7 +19331,7 @@
         </p:nvSpPr>
         <p:spPr>
           <a:xfrm>
-            <a:off x="2715644" y="4956692"/>
+            <a:off x="565805" y="1340500"/>
             <a:ext cx="1201446" cy="317367"/>
           </a:xfrm>
           <a:prstGeom prst="rect">
@@ -19419,13 +19383,13 @@
           <p:nvPr/>
         </p:nvPicPr>
         <p:blipFill>
-          <a:blip r:embed="rId7">
+          <a:blip r:embed="rId6">
             <a:extLst>
               <a:ext uri="{28A0092B-C50C-407E-A947-70E740481C1C}">
                 <a14:useLocalDpi xmlns:a14="http://schemas.microsoft.com/office/drawing/2010/main" val="0"/>
               </a:ext>
               <a:ext uri="{837473B0-CC2E-450A-ABE3-18F120FF3D39}">
-                <a1611:picAttrSrcUrl xmlns:a1611="http://schemas.microsoft.com/office/drawing/2016/11/main" r:id="rId8"/>
+                <a1611:picAttrSrcUrl xmlns:a1611="http://schemas.microsoft.com/office/drawing/2016/11/main" r:id="rId7"/>
               </a:ext>
             </a:extLst>
           </a:blip>
@@ -19435,7 +19399,7 @@
         </p:blipFill>
         <p:spPr>
           <a:xfrm>
-            <a:off x="3179855" y="4966399"/>
+            <a:off x="1030016" y="1350207"/>
             <a:ext cx="292298" cy="302703"/>
           </a:xfrm>
           <a:prstGeom prst="rect">
@@ -19458,13 +19422,13 @@
           <p:nvPr/>
         </p:nvPicPr>
         <p:blipFill>
-          <a:blip r:embed="rId9">
+          <a:blip r:embed="rId8">
             <a:extLst>
               <a:ext uri="{28A0092B-C50C-407E-A947-70E740481C1C}">
                 <a14:useLocalDpi xmlns:a14="http://schemas.microsoft.com/office/drawing/2010/main" val="0"/>
               </a:ext>
               <a:ext uri="{837473B0-CC2E-450A-ABE3-18F120FF3D39}">
-                <a1611:picAttrSrcUrl xmlns:a1611="http://schemas.microsoft.com/office/drawing/2016/11/main" r:id="rId10"/>
+                <a1611:picAttrSrcUrl xmlns:a1611="http://schemas.microsoft.com/office/drawing/2016/11/main" r:id="rId9"/>
               </a:ext>
             </a:extLst>
           </a:blip>
@@ -19474,7 +19438,7 @@
         </p:blipFill>
         <p:spPr>
           <a:xfrm>
-            <a:off x="3179481" y="4665549"/>
+            <a:off x="3170373" y="4683261"/>
             <a:ext cx="273771" cy="266732"/>
           </a:xfrm>
           <a:prstGeom prst="rect">
@@ -19537,13 +19501,13 @@
           <p:nvPr/>
         </p:nvPicPr>
         <p:blipFill>
-          <a:blip r:embed="rId11">
+          <a:blip r:embed="rId10">
             <a:extLst>
               <a:ext uri="{28A0092B-C50C-407E-A947-70E740481C1C}">
                 <a14:useLocalDpi xmlns:a14="http://schemas.microsoft.com/office/drawing/2010/main" val="0"/>
               </a:ext>
               <a:ext uri="{837473B0-CC2E-450A-ABE3-18F120FF3D39}">
-                <a1611:picAttrSrcUrl xmlns:a1611="http://schemas.microsoft.com/office/drawing/2016/11/main" r:id="rId12"/>
+                <a1611:picAttrSrcUrl xmlns:a1611="http://schemas.microsoft.com/office/drawing/2016/11/main" r:id="rId11"/>
               </a:ext>
             </a:extLst>
           </a:blip>
@@ -19576,13 +19540,13 @@
           <p:nvPr/>
         </p:nvPicPr>
         <p:blipFill>
-          <a:blip r:embed="rId13">
+          <a:blip r:embed="rId12">
             <a:extLst>
               <a:ext uri="{28A0092B-C50C-407E-A947-70E740481C1C}">
                 <a14:useLocalDpi xmlns:a14="http://schemas.microsoft.com/office/drawing/2010/main" val="0"/>
               </a:ext>
               <a:ext uri="{837473B0-CC2E-450A-ABE3-18F120FF3D39}">
-                <a1611:picAttrSrcUrl xmlns:a1611="http://schemas.microsoft.com/office/drawing/2016/11/main" r:id="rId14"/>
+                <a1611:picAttrSrcUrl xmlns:a1611="http://schemas.microsoft.com/office/drawing/2016/11/main" r:id="rId13"/>
               </a:ext>
             </a:extLst>
           </a:blip>
@@ -19702,8 +19666,8 @@
         </p:nvCxnSpPr>
         <p:spPr>
           <a:xfrm>
-            <a:off x="3918338" y="4807371"/>
-            <a:ext cx="776456" cy="856073"/>
+            <a:off x="3909230" y="4825083"/>
+            <a:ext cx="785564" cy="838361"/>
           </a:xfrm>
           <a:prstGeom prst="straightConnector1">
             <a:avLst/>
@@ -20338,16 +20302,16 @@
           <p:nvPr/>
         </p:nvPicPr>
         <p:blipFill>
-          <a:blip r:embed="rId15">
+          <a:blip r:embed="rId14">
             <a:extLst>
               <a:ext uri="{28A0092B-C50C-407E-A947-70E740481C1C}">
                 <a14:useLocalDpi xmlns:a14="http://schemas.microsoft.com/office/drawing/2010/main" val="0"/>
               </a:ext>
               <a:ext uri="{96DAC541-7B7A-43D3-8B79-37D633B846F1}">
-                <asvg:svgBlip xmlns:asvg="http://schemas.microsoft.com/office/drawing/2016/SVG/main" r:embed="rId16"/>
+                <asvg:svgBlip xmlns:asvg="http://schemas.microsoft.com/office/drawing/2016/SVG/main" r:embed="rId15"/>
               </a:ext>
               <a:ext uri="{837473B0-CC2E-450A-ABE3-18F120FF3D39}">
-                <a1611:picAttrSrcUrl xmlns:a1611="http://schemas.microsoft.com/office/drawing/2016/11/main" r:id="rId17"/>
+                <a1611:picAttrSrcUrl xmlns:a1611="http://schemas.microsoft.com/office/drawing/2016/11/main" r:id="rId16"/>
               </a:ext>
             </a:extLst>
           </a:blip>
@@ -20380,13 +20344,13 @@
           <p:nvPr/>
         </p:nvPicPr>
         <p:blipFill>
-          <a:blip r:embed="rId18">
+          <a:blip r:embed="rId17">
             <a:extLst>
               <a:ext uri="{28A0092B-C50C-407E-A947-70E740481C1C}">
                 <a14:useLocalDpi xmlns:a14="http://schemas.microsoft.com/office/drawing/2010/main" val="0"/>
               </a:ext>
               <a:ext uri="{837473B0-CC2E-450A-ABE3-18F120FF3D39}">
-                <a1611:picAttrSrcUrl xmlns:a1611="http://schemas.microsoft.com/office/drawing/2016/11/main" r:id="rId19"/>
+                <a1611:picAttrSrcUrl xmlns:a1611="http://schemas.microsoft.com/office/drawing/2016/11/main" r:id="rId18"/>
               </a:ext>
             </a:extLst>
           </a:blip>
@@ -20460,9 +20424,9 @@
           <p:nvPr/>
         </p:nvCxnSpPr>
         <p:spPr>
-          <a:xfrm flipV="1">
-            <a:off x="3917090" y="2805534"/>
-            <a:ext cx="5224580" cy="2309842"/>
+          <a:xfrm>
+            <a:off x="1767251" y="1499184"/>
+            <a:ext cx="7374419" cy="1306350"/>
           </a:xfrm>
           <a:prstGeom prst="straightConnector1">
             <a:avLst/>
@@ -20590,49 +20554,6 @@
       </p:sp>
       <p:sp>
         <p:nvSpPr>
-          <p:cNvPr id="22" name="TextBox 21">
-            <a:extLst>
-              <a:ext uri="{FF2B5EF4-FFF2-40B4-BE49-F238E27FC236}">
-                <a16:creationId xmlns:a16="http://schemas.microsoft.com/office/drawing/2014/main" id="{810D68E5-21D7-40E9-9198-97873BAC7A65}"/>
-              </a:ext>
-            </a:extLst>
-          </p:cNvPr>
-          <p:cNvSpPr txBox="1"/>
-          <p:nvPr/>
-        </p:nvSpPr>
-        <p:spPr>
-          <a:xfrm>
-            <a:off x="766837" y="4142455"/>
-            <a:ext cx="2063064" cy="923330"/>
-          </a:xfrm>
-          <a:prstGeom prst="rect">
-            <a:avLst/>
-          </a:prstGeom>
-          <a:noFill/>
-        </p:spPr>
-        <p:txBody>
-          <a:bodyPr wrap="square" rtlCol="0">
-            <a:spAutoFit/>
-          </a:bodyPr>
-          <a:lstStyle/>
-          <a:p>
-            <a:r>
-              <a:rPr lang="ko-KR" altLang="en-US" dirty="0"/>
-              <a:t>아이템 확대 이미지</a:t>
-            </a:r>
-            <a:r>
-              <a:rPr lang="en-US" altLang="ko-KR" dirty="0"/>
-              <a:t>(</a:t>
-            </a:r>
-            <a:r>
-              <a:rPr lang="ko-KR" altLang="en-US" dirty="0"/>
-              <a:t>아이템 목록 선택 시 </a:t>
-            </a:r>
-          </a:p>
-        </p:txBody>
-      </p:sp>
-      <p:sp>
-        <p:nvSpPr>
           <p:cNvPr id="46" name="TextBox 45">
             <a:extLst>
               <a:ext uri="{FF2B5EF4-FFF2-40B4-BE49-F238E27FC236}">
@@ -20686,7 +20607,7 @@
           <p:nvPr/>
         </p:nvPicPr>
         <p:blipFill>
-          <a:blip r:embed="rId2">
+          <a:blip r:embed="rId19">
             <a:extLst>
               <a:ext uri="{28A0092B-C50C-407E-A947-70E740481C1C}">
                 <a14:useLocalDpi xmlns:a14="http://schemas.microsoft.com/office/drawing/2010/main" val="0"/>
@@ -20707,6 +20628,200 @@
           </a:prstGeom>
         </p:spPr>
       </p:pic>
+      <p:sp>
+        <p:nvSpPr>
+          <p:cNvPr id="25" name="TextBox 24">
+            <a:extLst>
+              <a:ext uri="{FF2B5EF4-FFF2-40B4-BE49-F238E27FC236}">
+                <a16:creationId xmlns:a16="http://schemas.microsoft.com/office/drawing/2014/main" id="{C3DA0C9F-4CE2-4F02-B5A1-FCC8BB66DF63}"/>
+              </a:ext>
+            </a:extLst>
+          </p:cNvPr>
+          <p:cNvSpPr txBox="1"/>
+          <p:nvPr/>
+        </p:nvSpPr>
+        <p:spPr>
+          <a:xfrm>
+            <a:off x="4999839" y="201336"/>
+            <a:ext cx="4471332" cy="369332"/>
+          </a:xfrm>
+          <a:prstGeom prst="rect">
+            <a:avLst/>
+          </a:prstGeom>
+          <a:noFill/>
+        </p:spPr>
+        <p:txBody>
+          <a:bodyPr wrap="square" rtlCol="0">
+            <a:spAutoFit/>
+          </a:bodyPr>
+          <a:lstStyle/>
+          <a:p>
+            <a:r>
+              <a:rPr lang="en-US" altLang="ko-KR" dirty="0"/>
+              <a:t>- </a:t>
+            </a:r>
+            <a:r>
+              <a:rPr lang="ko-KR" altLang="en-US" dirty="0"/>
+              <a:t>저장 누르면 옷장 리스트에 추가 </a:t>
+            </a:r>
+          </a:p>
+        </p:txBody>
+      </p:sp>
+      <p:pic>
+        <p:nvPicPr>
+          <p:cNvPr id="47" name="그림 46">
+            <a:extLst>
+              <a:ext uri="{FF2B5EF4-FFF2-40B4-BE49-F238E27FC236}">
+                <a16:creationId xmlns:a16="http://schemas.microsoft.com/office/drawing/2014/main" id="{22DF5270-439D-4FD8-AA91-C48BF88A8AB4}"/>
+              </a:ext>
+            </a:extLst>
+          </p:cNvPr>
+          <p:cNvPicPr>
+            <a:picLocks noChangeAspect="1"/>
+          </p:cNvPicPr>
+          <p:nvPr/>
+        </p:nvPicPr>
+        <p:blipFill>
+          <a:blip r:embed="rId19">
+            <a:extLst>
+              <a:ext uri="{28A0092B-C50C-407E-A947-70E740481C1C}">
+                <a14:useLocalDpi xmlns:a14="http://schemas.microsoft.com/office/drawing/2010/main" val="0"/>
+              </a:ext>
+            </a:extLst>
+          </a:blip>
+          <a:stretch>
+            <a:fillRect/>
+          </a:stretch>
+        </p:blipFill>
+        <p:spPr>
+          <a:xfrm>
+            <a:off x="715153" y="4124875"/>
+            <a:ext cx="299874" cy="299874"/>
+          </a:xfrm>
+          <a:prstGeom prst="rect">
+            <a:avLst/>
+          </a:prstGeom>
+        </p:spPr>
+      </p:pic>
+      <p:pic>
+        <p:nvPicPr>
+          <p:cNvPr id="50" name="그림 49">
+            <a:extLst>
+              <a:ext uri="{FF2B5EF4-FFF2-40B4-BE49-F238E27FC236}">
+                <a16:creationId xmlns:a16="http://schemas.microsoft.com/office/drawing/2014/main" id="{56DC338D-1808-4C7D-8474-0E37F39EF0C3}"/>
+              </a:ext>
+            </a:extLst>
+          </p:cNvPr>
+          <p:cNvPicPr>
+            <a:picLocks noChangeAspect="1"/>
+          </p:cNvPicPr>
+          <p:nvPr/>
+        </p:nvPicPr>
+        <p:blipFill>
+          <a:blip r:embed="rId19">
+            <a:extLst>
+              <a:ext uri="{28A0092B-C50C-407E-A947-70E740481C1C}">
+                <a14:useLocalDpi xmlns:a14="http://schemas.microsoft.com/office/drawing/2010/main" val="0"/>
+              </a:ext>
+            </a:extLst>
+          </a:blip>
+          <a:stretch>
+            <a:fillRect/>
+          </a:stretch>
+        </p:blipFill>
+        <p:spPr>
+          <a:xfrm>
+            <a:off x="1239292" y="4130073"/>
+            <a:ext cx="299874" cy="299874"/>
+          </a:xfrm>
+          <a:prstGeom prst="rect">
+            <a:avLst/>
+          </a:prstGeom>
+        </p:spPr>
+      </p:pic>
+      <p:sp>
+        <p:nvSpPr>
+          <p:cNvPr id="27" name="TextBox 26">
+            <a:extLst>
+              <a:ext uri="{FF2B5EF4-FFF2-40B4-BE49-F238E27FC236}">
+                <a16:creationId xmlns:a16="http://schemas.microsoft.com/office/drawing/2014/main" id="{BFAAF27B-36E0-4147-AC2A-DEF6E7EE68E4}"/>
+              </a:ext>
+            </a:extLst>
+          </p:cNvPr>
+          <p:cNvSpPr txBox="1"/>
+          <p:nvPr/>
+        </p:nvSpPr>
+        <p:spPr>
+          <a:xfrm>
+            <a:off x="917275" y="4586210"/>
+            <a:ext cx="1716025" cy="369332"/>
+          </a:xfrm>
+          <a:prstGeom prst="rect">
+            <a:avLst/>
+          </a:prstGeom>
+          <a:noFill/>
+        </p:spPr>
+        <p:txBody>
+          <a:bodyPr wrap="square" rtlCol="0">
+            <a:spAutoFit/>
+          </a:bodyPr>
+          <a:lstStyle/>
+          <a:p>
+            <a:r>
+              <a:rPr lang="ko-KR" altLang="en-US" dirty="0"/>
+              <a:t>옷장 리스트</a:t>
+            </a:r>
+          </a:p>
+        </p:txBody>
+      </p:sp>
+      <p:cxnSp>
+        <p:nvCxnSpPr>
+          <p:cNvPr id="36" name="직선 화살표 연결선 35">
+            <a:extLst>
+              <a:ext uri="{FF2B5EF4-FFF2-40B4-BE49-F238E27FC236}">
+                <a16:creationId xmlns:a16="http://schemas.microsoft.com/office/drawing/2014/main" id="{FF36B109-2342-489B-9111-D1CBAEC4BDC0}"/>
+              </a:ext>
+            </a:extLst>
+          </p:cNvPr>
+          <p:cNvCxnSpPr>
+            <a:stCxn id="17" idx="3"/>
+            <a:endCxn id="25" idx="1"/>
+          </p:cNvCxnSpPr>
+          <p:nvPr/>
+        </p:nvCxnSpPr>
+        <p:spPr>
+          <a:xfrm flipV="1">
+            <a:off x="1767251" y="386002"/>
+            <a:ext cx="3232588" cy="1113182"/>
+          </a:xfrm>
+          <a:prstGeom prst="straightConnector1">
+            <a:avLst/>
+          </a:prstGeom>
+          <a:ln>
+            <a:solidFill>
+              <a:schemeClr val="tx1">
+                <a:lumMod val="95000"/>
+                <a:lumOff val="5000"/>
+              </a:schemeClr>
+            </a:solidFill>
+            <a:tailEnd type="triangle"/>
+          </a:ln>
+        </p:spPr>
+        <p:style>
+          <a:lnRef idx="1">
+            <a:schemeClr val="accent1"/>
+          </a:lnRef>
+          <a:fillRef idx="0">
+            <a:schemeClr val="accent1"/>
+          </a:fillRef>
+          <a:effectRef idx="0">
+            <a:schemeClr val="accent1"/>
+          </a:effectRef>
+          <a:fontRef idx="minor">
+            <a:schemeClr val="tx1"/>
+          </a:fontRef>
+        </p:style>
+      </p:cxnSp>
     </p:spTree>
     <p:extLst>
       <p:ext uri="{BB962C8B-B14F-4D97-AF65-F5344CB8AC3E}">

</xml_diff>